<commit_message>
fix: Printing example code was missing
</commit_message>
<xml_diff>
--- a/Nizi/Prezentacija/Nizi.pptx
+++ b/Nizi/Prezentacija/Nizi.pptx
@@ -1814,6 +1814,1033 @@
 </file>
 
 <file path=ppt/notesSlides/notesSlide6.xml><?xml version="1.0" encoding="utf-8"?>
+<p:notes xmlns:a="http://schemas.openxmlformats.org/drawingml/2006/main" xmlns:r="http://schemas.openxmlformats.org/officeDocument/2006/relationships" xmlns:p="http://schemas.openxmlformats.org/presentationml/2006/main">
+  <p:cSld>
+    <p:spTree>
+      <p:nvGrpSpPr>
+        <p:cNvPr id="1" name=""/>
+        <p:cNvGrpSpPr/>
+        <p:nvPr/>
+      </p:nvGrpSpPr>
+      <p:grpSpPr>
+        <a:xfrm>
+          <a:off x="0" y="0"/>
+          <a:ext cx="0" cy="0"/>
+          <a:chOff x="0" y="0"/>
+          <a:chExt cx="0" cy="0"/>
+        </a:xfrm>
+      </p:grpSpPr>
+      <p:sp>
+        <p:nvSpPr>
+          <p:cNvPr id="2" name="Slide Image Placeholder 1"/>
+          <p:cNvSpPr>
+            <a:spLocks noGrp="1" noRot="1" noChangeAspect="1"/>
+          </p:cNvSpPr>
+          <p:nvPr>
+            <p:ph type="sldImg"/>
+          </p:nvPr>
+        </p:nvSpPr>
+        <p:spPr/>
+      </p:sp>
+      <p:sp>
+        <p:nvSpPr>
+          <p:cNvPr id="3" name="Notes Placeholder 2"/>
+          <p:cNvSpPr>
+            <a:spLocks noGrp="1"/>
+          </p:cNvSpPr>
+          <p:nvPr>
+            <p:ph type="body" idx="1"/>
+          </p:nvPr>
+        </p:nvSpPr>
+        <p:spPr/>
+        <p:txBody>
+          <a:bodyPr/>
+          <a:lstStyle/>
+          <a:p>
+            <a:r>
+              <a:rPr lang="en-US" b="0" dirty="0">
+                <a:solidFill>
+                  <a:srgbClr val="FFA759"/>
+                </a:solidFill>
+                <a:effectLst/>
+                <a:latin typeface="Consolas" panose="020B0609020204030204" pitchFamily="49" charset="0"/>
+              </a:rPr>
+              <a:t>#include</a:t>
+            </a:r>
+            <a:r>
+              <a:rPr lang="en-US" b="0" dirty="0">
+                <a:solidFill>
+                  <a:srgbClr val="CBCCC6"/>
+                </a:solidFill>
+                <a:effectLst/>
+                <a:latin typeface="Consolas" panose="020B0609020204030204" pitchFamily="49" charset="0"/>
+              </a:rPr>
+              <a:t> </a:t>
+            </a:r>
+            <a:r>
+              <a:rPr lang="en-US" b="0" dirty="0">
+                <a:solidFill>
+                  <a:srgbClr val="BAE67E"/>
+                </a:solidFill>
+                <a:effectLst/>
+                <a:latin typeface="Consolas" panose="020B0609020204030204" pitchFamily="49" charset="0"/>
+              </a:rPr>
+              <a:t>&lt;iostream&gt;</a:t>
+            </a:r>
+            <a:endParaRPr lang="en-US" b="0" dirty="0">
+              <a:solidFill>
+                <a:srgbClr val="CBCCC6"/>
+              </a:solidFill>
+              <a:effectLst/>
+              <a:latin typeface="Consolas" panose="020B0609020204030204" pitchFamily="49" charset="0"/>
+            </a:endParaRPr>
+          </a:p>
+          <a:p>
+            <a:br>
+              <a:rPr lang="en-US" b="0" dirty="0">
+                <a:solidFill>
+                  <a:srgbClr val="CBCCC6"/>
+                </a:solidFill>
+                <a:effectLst/>
+                <a:latin typeface="Consolas" panose="020B0609020204030204" pitchFamily="49" charset="0"/>
+              </a:rPr>
+            </a:br>
+            <a:r>
+              <a:rPr lang="en-US" b="0" dirty="0">
+                <a:solidFill>
+                  <a:srgbClr val="FFA759"/>
+                </a:solidFill>
+                <a:effectLst/>
+                <a:latin typeface="Consolas" panose="020B0609020204030204" pitchFamily="49" charset="0"/>
+              </a:rPr>
+              <a:t>using</a:t>
+            </a:r>
+            <a:r>
+              <a:rPr lang="en-US" b="0" dirty="0">
+                <a:solidFill>
+                  <a:srgbClr val="CBCCC6"/>
+                </a:solidFill>
+                <a:effectLst/>
+                <a:latin typeface="Consolas" panose="020B0609020204030204" pitchFamily="49" charset="0"/>
+              </a:rPr>
+              <a:t> </a:t>
+            </a:r>
+            <a:r>
+              <a:rPr lang="en-US" b="0" dirty="0">
+                <a:solidFill>
+                  <a:srgbClr val="FFA759"/>
+                </a:solidFill>
+                <a:effectLst/>
+                <a:latin typeface="Consolas" panose="020B0609020204030204" pitchFamily="49" charset="0"/>
+              </a:rPr>
+              <a:t>namespace</a:t>
+            </a:r>
+            <a:r>
+              <a:rPr lang="en-US" b="0" dirty="0">
+                <a:solidFill>
+                  <a:srgbClr val="CBCCC6"/>
+                </a:solidFill>
+                <a:effectLst/>
+                <a:latin typeface="Consolas" panose="020B0609020204030204" pitchFamily="49" charset="0"/>
+              </a:rPr>
+              <a:t> </a:t>
+            </a:r>
+            <a:r>
+              <a:rPr lang="en-US" b="0" dirty="0">
+                <a:solidFill>
+                  <a:srgbClr val="73D0FF"/>
+                </a:solidFill>
+                <a:effectLst/>
+                <a:latin typeface="Consolas" panose="020B0609020204030204" pitchFamily="49" charset="0"/>
+              </a:rPr>
+              <a:t>std</a:t>
+            </a:r>
+            <a:r>
+              <a:rPr lang="en-US" b="0" dirty="0">
+                <a:solidFill>
+                  <a:srgbClr val="CBCCC6"/>
+                </a:solidFill>
+                <a:effectLst/>
+                <a:latin typeface="Consolas" panose="020B0609020204030204" pitchFamily="49" charset="0"/>
+              </a:rPr>
+              <a:t>;</a:t>
+            </a:r>
+          </a:p>
+          <a:p>
+            <a:br>
+              <a:rPr lang="en-US" b="0" dirty="0">
+                <a:solidFill>
+                  <a:srgbClr val="CBCCC6"/>
+                </a:solidFill>
+                <a:effectLst/>
+                <a:latin typeface="Consolas" panose="020B0609020204030204" pitchFamily="49" charset="0"/>
+              </a:rPr>
+            </a:br>
+            <a:r>
+              <a:rPr lang="en-US" b="0" dirty="0">
+                <a:solidFill>
+                  <a:srgbClr val="FFA759"/>
+                </a:solidFill>
+                <a:effectLst/>
+                <a:latin typeface="Consolas" panose="020B0609020204030204" pitchFamily="49" charset="0"/>
+              </a:rPr>
+              <a:t>int</a:t>
+            </a:r>
+            <a:r>
+              <a:rPr lang="en-US" b="0" dirty="0">
+                <a:solidFill>
+                  <a:srgbClr val="CBCCC6"/>
+                </a:solidFill>
+                <a:effectLst/>
+                <a:latin typeface="Consolas" panose="020B0609020204030204" pitchFamily="49" charset="0"/>
+              </a:rPr>
+              <a:t> </a:t>
+            </a:r>
+            <a:r>
+              <a:rPr lang="en-US" b="0" dirty="0">
+                <a:solidFill>
+                  <a:srgbClr val="FFD580"/>
+                </a:solidFill>
+                <a:effectLst/>
+                <a:latin typeface="Consolas" panose="020B0609020204030204" pitchFamily="49" charset="0"/>
+              </a:rPr>
+              <a:t>main</a:t>
+            </a:r>
+            <a:r>
+              <a:rPr lang="en-US" b="0" dirty="0">
+                <a:solidFill>
+                  <a:srgbClr val="CBCCC6"/>
+                </a:solidFill>
+                <a:effectLst/>
+                <a:latin typeface="Consolas" panose="020B0609020204030204" pitchFamily="49" charset="0"/>
+              </a:rPr>
+              <a:t>()</a:t>
+            </a:r>
+          </a:p>
+          <a:p>
+            <a:r>
+              <a:rPr lang="en-US" b="0" dirty="0">
+                <a:solidFill>
+                  <a:srgbClr val="CBCCC6"/>
+                </a:solidFill>
+                <a:effectLst/>
+                <a:latin typeface="Consolas" panose="020B0609020204030204" pitchFamily="49" charset="0"/>
+              </a:rPr>
+              <a:t>{</a:t>
+            </a:r>
+          </a:p>
+          <a:p>
+            <a:r>
+              <a:rPr lang="en-US" b="0" dirty="0">
+                <a:solidFill>
+                  <a:srgbClr val="CBCCC6"/>
+                </a:solidFill>
+                <a:effectLst/>
+                <a:latin typeface="Consolas" panose="020B0609020204030204" pitchFamily="49" charset="0"/>
+              </a:rPr>
+              <a:t>    </a:t>
+            </a:r>
+            <a:r>
+              <a:rPr lang="en-US" b="0" dirty="0">
+                <a:solidFill>
+                  <a:srgbClr val="FFA759"/>
+                </a:solidFill>
+                <a:effectLst/>
+                <a:latin typeface="Consolas" panose="020B0609020204030204" pitchFamily="49" charset="0"/>
+              </a:rPr>
+              <a:t>int</a:t>
+            </a:r>
+            <a:r>
+              <a:rPr lang="en-US" b="0" dirty="0">
+                <a:solidFill>
+                  <a:srgbClr val="CBCCC6"/>
+                </a:solidFill>
+                <a:effectLst/>
+                <a:latin typeface="Consolas" panose="020B0609020204030204" pitchFamily="49" charset="0"/>
+              </a:rPr>
+              <a:t> </a:t>
+            </a:r>
+            <a:r>
+              <a:rPr lang="en-US" b="0" dirty="0" err="1">
+                <a:solidFill>
+                  <a:srgbClr val="CBCCC6"/>
+                </a:solidFill>
+                <a:effectLst/>
+                <a:latin typeface="Consolas" panose="020B0609020204030204" pitchFamily="49" charset="0"/>
+              </a:rPr>
+              <a:t>broevi</a:t>
+            </a:r>
+            <a:r>
+              <a:rPr lang="en-US" b="0" dirty="0">
+                <a:solidFill>
+                  <a:srgbClr val="CBCCC6"/>
+                </a:solidFill>
+                <a:effectLst/>
+                <a:latin typeface="Consolas" panose="020B0609020204030204" pitchFamily="49" charset="0"/>
+              </a:rPr>
+              <a:t>[] </a:t>
+            </a:r>
+            <a:r>
+              <a:rPr lang="en-US" b="0" dirty="0">
+                <a:solidFill>
+                  <a:srgbClr val="F29E74"/>
+                </a:solidFill>
+                <a:effectLst/>
+                <a:latin typeface="Consolas" panose="020B0609020204030204" pitchFamily="49" charset="0"/>
+              </a:rPr>
+              <a:t>=</a:t>
+            </a:r>
+            <a:r>
+              <a:rPr lang="en-US" b="0" dirty="0">
+                <a:solidFill>
+                  <a:srgbClr val="CBCCC6"/>
+                </a:solidFill>
+                <a:effectLst/>
+                <a:latin typeface="Consolas" panose="020B0609020204030204" pitchFamily="49" charset="0"/>
+              </a:rPr>
+              <a:t> {</a:t>
+            </a:r>
+            <a:r>
+              <a:rPr lang="en-US" b="0" dirty="0">
+                <a:solidFill>
+                  <a:srgbClr val="FFCC66"/>
+                </a:solidFill>
+                <a:effectLst/>
+                <a:latin typeface="Consolas" panose="020B0609020204030204" pitchFamily="49" charset="0"/>
+              </a:rPr>
+              <a:t>3</a:t>
+            </a:r>
+            <a:r>
+              <a:rPr lang="en-US" b="0" dirty="0">
+                <a:solidFill>
+                  <a:srgbClr val="CBCCC6"/>
+                </a:solidFill>
+                <a:effectLst/>
+                <a:latin typeface="Consolas" panose="020B0609020204030204" pitchFamily="49" charset="0"/>
+              </a:rPr>
+              <a:t>, </a:t>
+            </a:r>
+            <a:r>
+              <a:rPr lang="en-US" b="0" dirty="0">
+                <a:solidFill>
+                  <a:srgbClr val="FFCC66"/>
+                </a:solidFill>
+                <a:effectLst/>
+                <a:latin typeface="Consolas" panose="020B0609020204030204" pitchFamily="49" charset="0"/>
+              </a:rPr>
+              <a:t>6</a:t>
+            </a:r>
+            <a:r>
+              <a:rPr lang="en-US" b="0" dirty="0">
+                <a:solidFill>
+                  <a:srgbClr val="CBCCC6"/>
+                </a:solidFill>
+                <a:effectLst/>
+                <a:latin typeface="Consolas" panose="020B0609020204030204" pitchFamily="49" charset="0"/>
+              </a:rPr>
+              <a:t>, </a:t>
+            </a:r>
+            <a:r>
+              <a:rPr lang="en-US" b="0" dirty="0">
+                <a:solidFill>
+                  <a:srgbClr val="FFCC66"/>
+                </a:solidFill>
+                <a:effectLst/>
+                <a:latin typeface="Consolas" panose="020B0609020204030204" pitchFamily="49" charset="0"/>
+              </a:rPr>
+              <a:t>14</a:t>
+            </a:r>
+            <a:r>
+              <a:rPr lang="en-US" b="0" dirty="0">
+                <a:solidFill>
+                  <a:srgbClr val="CBCCC6"/>
+                </a:solidFill>
+                <a:effectLst/>
+                <a:latin typeface="Consolas" panose="020B0609020204030204" pitchFamily="49" charset="0"/>
+              </a:rPr>
+              <a:t>, </a:t>
+            </a:r>
+            <a:r>
+              <a:rPr lang="en-US" b="0" dirty="0">
+                <a:solidFill>
+                  <a:srgbClr val="FFCC66"/>
+                </a:solidFill>
+                <a:effectLst/>
+                <a:latin typeface="Consolas" panose="020B0609020204030204" pitchFamily="49" charset="0"/>
+              </a:rPr>
+              <a:t>100</a:t>
+            </a:r>
+            <a:r>
+              <a:rPr lang="en-US" b="0" dirty="0">
+                <a:solidFill>
+                  <a:srgbClr val="CBCCC6"/>
+                </a:solidFill>
+                <a:effectLst/>
+                <a:latin typeface="Consolas" panose="020B0609020204030204" pitchFamily="49" charset="0"/>
+              </a:rPr>
+              <a:t>, </a:t>
+            </a:r>
+            <a:r>
+              <a:rPr lang="en-US" b="0" dirty="0">
+                <a:solidFill>
+                  <a:srgbClr val="FFCC66"/>
+                </a:solidFill>
+                <a:effectLst/>
+                <a:latin typeface="Consolas" panose="020B0609020204030204" pitchFamily="49" charset="0"/>
+              </a:rPr>
+              <a:t>89</a:t>
+            </a:r>
+            <a:r>
+              <a:rPr lang="en-US" b="0" dirty="0">
+                <a:solidFill>
+                  <a:srgbClr val="CBCCC6"/>
+                </a:solidFill>
+                <a:effectLst/>
+                <a:latin typeface="Consolas" panose="020B0609020204030204" pitchFamily="49" charset="0"/>
+              </a:rPr>
+              <a:t>, </a:t>
+            </a:r>
+            <a:r>
+              <a:rPr lang="en-US" b="0" dirty="0">
+                <a:solidFill>
+                  <a:srgbClr val="FFCC66"/>
+                </a:solidFill>
+                <a:effectLst/>
+                <a:latin typeface="Consolas" panose="020B0609020204030204" pitchFamily="49" charset="0"/>
+              </a:rPr>
+              <a:t>33</a:t>
+            </a:r>
+            <a:r>
+              <a:rPr lang="en-US" b="0" dirty="0">
+                <a:solidFill>
+                  <a:srgbClr val="CBCCC6"/>
+                </a:solidFill>
+                <a:effectLst/>
+                <a:latin typeface="Consolas" panose="020B0609020204030204" pitchFamily="49" charset="0"/>
+              </a:rPr>
+              <a:t>, </a:t>
+            </a:r>
+            <a:r>
+              <a:rPr lang="en-US" b="0" dirty="0">
+                <a:solidFill>
+                  <a:srgbClr val="FFCC66"/>
+                </a:solidFill>
+                <a:effectLst/>
+                <a:latin typeface="Consolas" panose="020B0609020204030204" pitchFamily="49" charset="0"/>
+              </a:rPr>
+              <a:t>124</a:t>
+            </a:r>
+            <a:r>
+              <a:rPr lang="en-US" b="0" dirty="0">
+                <a:solidFill>
+                  <a:srgbClr val="CBCCC6"/>
+                </a:solidFill>
+                <a:effectLst/>
+                <a:latin typeface="Consolas" panose="020B0609020204030204" pitchFamily="49" charset="0"/>
+              </a:rPr>
+              <a:t>, </a:t>
+            </a:r>
+            <a:r>
+              <a:rPr lang="en-US" b="0" dirty="0">
+                <a:solidFill>
+                  <a:srgbClr val="FFCC66"/>
+                </a:solidFill>
+                <a:effectLst/>
+                <a:latin typeface="Consolas" panose="020B0609020204030204" pitchFamily="49" charset="0"/>
+              </a:rPr>
+              <a:t>322</a:t>
+            </a:r>
+            <a:r>
+              <a:rPr lang="en-US" b="0" dirty="0">
+                <a:solidFill>
+                  <a:srgbClr val="CBCCC6"/>
+                </a:solidFill>
+                <a:effectLst/>
+                <a:latin typeface="Consolas" panose="020B0609020204030204" pitchFamily="49" charset="0"/>
+              </a:rPr>
+              <a:t>};</a:t>
+            </a:r>
+          </a:p>
+          <a:p>
+            <a:br>
+              <a:rPr lang="en-US" b="0" dirty="0">
+                <a:solidFill>
+                  <a:srgbClr val="CBCCC6"/>
+                </a:solidFill>
+                <a:effectLst/>
+                <a:latin typeface="Consolas" panose="020B0609020204030204" pitchFamily="49" charset="0"/>
+              </a:rPr>
+            </a:br>
+            <a:r>
+              <a:rPr lang="en-US" b="0" dirty="0">
+                <a:solidFill>
+                  <a:srgbClr val="CBCCC6"/>
+                </a:solidFill>
+                <a:effectLst/>
+                <a:latin typeface="Consolas" panose="020B0609020204030204" pitchFamily="49" charset="0"/>
+              </a:rPr>
+              <a:t>    </a:t>
+            </a:r>
+            <a:r>
+              <a:rPr lang="en-US" b="0" dirty="0" err="1">
+                <a:solidFill>
+                  <a:srgbClr val="CBCCC6"/>
+                </a:solidFill>
+                <a:effectLst/>
+                <a:latin typeface="Consolas" panose="020B0609020204030204" pitchFamily="49" charset="0"/>
+              </a:rPr>
+              <a:t>cout</a:t>
+            </a:r>
+            <a:r>
+              <a:rPr lang="en-US" b="0" dirty="0">
+                <a:solidFill>
+                  <a:srgbClr val="CBCCC6"/>
+                </a:solidFill>
+                <a:effectLst/>
+                <a:latin typeface="Consolas" panose="020B0609020204030204" pitchFamily="49" charset="0"/>
+              </a:rPr>
+              <a:t> </a:t>
+            </a:r>
+            <a:r>
+              <a:rPr lang="en-US" b="0" dirty="0">
+                <a:solidFill>
+                  <a:srgbClr val="F29E74"/>
+                </a:solidFill>
+                <a:effectLst/>
+                <a:latin typeface="Consolas" panose="020B0609020204030204" pitchFamily="49" charset="0"/>
+              </a:rPr>
+              <a:t>&lt;&lt;</a:t>
+            </a:r>
+            <a:r>
+              <a:rPr lang="en-US" b="0" dirty="0">
+                <a:solidFill>
+                  <a:srgbClr val="CBCCC6"/>
+                </a:solidFill>
+                <a:effectLst/>
+                <a:latin typeface="Consolas" panose="020B0609020204030204" pitchFamily="49" charset="0"/>
+              </a:rPr>
+              <a:t> </a:t>
+            </a:r>
+            <a:r>
+              <a:rPr lang="en-US" b="0" dirty="0">
+                <a:solidFill>
+                  <a:srgbClr val="BAE67E"/>
+                </a:solidFill>
+                <a:effectLst/>
+                <a:latin typeface="Consolas" panose="020B0609020204030204" pitchFamily="49" charset="0"/>
+              </a:rPr>
+              <a:t>"</a:t>
+            </a:r>
+            <a:r>
+              <a:rPr lang="en-US" b="0" dirty="0" err="1">
+                <a:solidFill>
+                  <a:srgbClr val="BAE67E"/>
+                </a:solidFill>
+                <a:effectLst/>
+                <a:latin typeface="Consolas" panose="020B0609020204030204" pitchFamily="49" charset="0"/>
+              </a:rPr>
+              <a:t>Broevite</a:t>
+            </a:r>
+            <a:r>
+              <a:rPr lang="en-US" b="0" dirty="0">
+                <a:solidFill>
+                  <a:srgbClr val="BAE67E"/>
+                </a:solidFill>
+                <a:effectLst/>
+                <a:latin typeface="Consolas" panose="020B0609020204030204" pitchFamily="49" charset="0"/>
+              </a:rPr>
+              <a:t> se: "</a:t>
+            </a:r>
+            <a:r>
+              <a:rPr lang="en-US" b="0" dirty="0">
+                <a:solidFill>
+                  <a:srgbClr val="CBCCC6"/>
+                </a:solidFill>
+                <a:effectLst/>
+                <a:latin typeface="Consolas" panose="020B0609020204030204" pitchFamily="49" charset="0"/>
+              </a:rPr>
+              <a:t>;</a:t>
+            </a:r>
+          </a:p>
+          <a:p>
+            <a:br>
+              <a:rPr lang="en-US" b="0" dirty="0">
+                <a:solidFill>
+                  <a:srgbClr val="CBCCC6"/>
+                </a:solidFill>
+                <a:effectLst/>
+                <a:latin typeface="Consolas" panose="020B0609020204030204" pitchFamily="49" charset="0"/>
+              </a:rPr>
+            </a:br>
+            <a:r>
+              <a:rPr lang="en-US" b="0" dirty="0">
+                <a:solidFill>
+                  <a:srgbClr val="CBCCC6"/>
+                </a:solidFill>
+                <a:effectLst/>
+                <a:latin typeface="Consolas" panose="020B0609020204030204" pitchFamily="49" charset="0"/>
+              </a:rPr>
+              <a:t>    </a:t>
+            </a:r>
+            <a:r>
+              <a:rPr lang="en-US" b="0" dirty="0">
+                <a:solidFill>
+                  <a:srgbClr val="FFA759"/>
+                </a:solidFill>
+                <a:effectLst/>
+                <a:latin typeface="Consolas" panose="020B0609020204030204" pitchFamily="49" charset="0"/>
+              </a:rPr>
+              <a:t>for</a:t>
+            </a:r>
+            <a:r>
+              <a:rPr lang="en-US" b="0" dirty="0">
+                <a:solidFill>
+                  <a:srgbClr val="CBCCC6"/>
+                </a:solidFill>
+                <a:effectLst/>
+                <a:latin typeface="Consolas" panose="020B0609020204030204" pitchFamily="49" charset="0"/>
+              </a:rPr>
+              <a:t> (</a:t>
+            </a:r>
+            <a:r>
+              <a:rPr lang="en-US" b="0" dirty="0">
+                <a:solidFill>
+                  <a:srgbClr val="FFA759"/>
+                </a:solidFill>
+                <a:effectLst/>
+                <a:latin typeface="Consolas" panose="020B0609020204030204" pitchFamily="49" charset="0"/>
+              </a:rPr>
+              <a:t>int</a:t>
+            </a:r>
+            <a:r>
+              <a:rPr lang="en-US" b="0" dirty="0">
+                <a:solidFill>
+                  <a:srgbClr val="CBCCC6"/>
+                </a:solidFill>
+                <a:effectLst/>
+                <a:latin typeface="Consolas" panose="020B0609020204030204" pitchFamily="49" charset="0"/>
+              </a:rPr>
+              <a:t> </a:t>
+            </a:r>
+            <a:r>
+              <a:rPr lang="en-US" b="0" dirty="0" err="1">
+                <a:solidFill>
+                  <a:srgbClr val="CBCCC6"/>
+                </a:solidFill>
+                <a:effectLst/>
+                <a:latin typeface="Consolas" panose="020B0609020204030204" pitchFamily="49" charset="0"/>
+              </a:rPr>
+              <a:t>i</a:t>
+            </a:r>
+            <a:r>
+              <a:rPr lang="en-US" b="0" dirty="0">
+                <a:solidFill>
+                  <a:srgbClr val="CBCCC6"/>
+                </a:solidFill>
+                <a:effectLst/>
+                <a:latin typeface="Consolas" panose="020B0609020204030204" pitchFamily="49" charset="0"/>
+              </a:rPr>
+              <a:t> </a:t>
+            </a:r>
+            <a:r>
+              <a:rPr lang="en-US" b="0" dirty="0">
+                <a:solidFill>
+                  <a:srgbClr val="F29E74"/>
+                </a:solidFill>
+                <a:effectLst/>
+                <a:latin typeface="Consolas" panose="020B0609020204030204" pitchFamily="49" charset="0"/>
+              </a:rPr>
+              <a:t>=</a:t>
+            </a:r>
+            <a:r>
+              <a:rPr lang="en-US" b="0" dirty="0">
+                <a:solidFill>
+                  <a:srgbClr val="CBCCC6"/>
+                </a:solidFill>
+                <a:effectLst/>
+                <a:latin typeface="Consolas" panose="020B0609020204030204" pitchFamily="49" charset="0"/>
+              </a:rPr>
+              <a:t> </a:t>
+            </a:r>
+            <a:r>
+              <a:rPr lang="en-US" b="0" dirty="0">
+                <a:solidFill>
+                  <a:srgbClr val="FFCC66"/>
+                </a:solidFill>
+                <a:effectLst/>
+                <a:latin typeface="Consolas" panose="020B0609020204030204" pitchFamily="49" charset="0"/>
+              </a:rPr>
+              <a:t>0</a:t>
+            </a:r>
+            <a:r>
+              <a:rPr lang="en-US" b="0" dirty="0">
+                <a:solidFill>
+                  <a:srgbClr val="CBCCC6"/>
+                </a:solidFill>
+                <a:effectLst/>
+                <a:latin typeface="Consolas" panose="020B0609020204030204" pitchFamily="49" charset="0"/>
+              </a:rPr>
+              <a:t>; </a:t>
+            </a:r>
+            <a:r>
+              <a:rPr lang="en-US" b="0" dirty="0" err="1">
+                <a:solidFill>
+                  <a:srgbClr val="CBCCC6"/>
+                </a:solidFill>
+                <a:effectLst/>
+                <a:latin typeface="Consolas" panose="020B0609020204030204" pitchFamily="49" charset="0"/>
+              </a:rPr>
+              <a:t>i</a:t>
+            </a:r>
+            <a:r>
+              <a:rPr lang="en-US" b="0" dirty="0">
+                <a:solidFill>
+                  <a:srgbClr val="CBCCC6"/>
+                </a:solidFill>
+                <a:effectLst/>
+                <a:latin typeface="Consolas" panose="020B0609020204030204" pitchFamily="49" charset="0"/>
+              </a:rPr>
+              <a:t> </a:t>
+            </a:r>
+            <a:r>
+              <a:rPr lang="en-US" b="0" dirty="0">
+                <a:solidFill>
+                  <a:srgbClr val="F29E74"/>
+                </a:solidFill>
+                <a:effectLst/>
+                <a:latin typeface="Consolas" panose="020B0609020204030204" pitchFamily="49" charset="0"/>
+              </a:rPr>
+              <a:t>&lt;</a:t>
+            </a:r>
+            <a:r>
+              <a:rPr lang="en-US" b="0" dirty="0">
+                <a:solidFill>
+                  <a:srgbClr val="CBCCC6"/>
+                </a:solidFill>
+                <a:effectLst/>
+                <a:latin typeface="Consolas" panose="020B0609020204030204" pitchFamily="49" charset="0"/>
+              </a:rPr>
+              <a:t> </a:t>
+            </a:r>
+            <a:r>
+              <a:rPr lang="en-US" b="0" dirty="0">
+                <a:solidFill>
+                  <a:srgbClr val="FFCC66"/>
+                </a:solidFill>
+                <a:effectLst/>
+                <a:latin typeface="Consolas" panose="020B0609020204030204" pitchFamily="49" charset="0"/>
+              </a:rPr>
+              <a:t>8</a:t>
+            </a:r>
+            <a:r>
+              <a:rPr lang="en-US" b="0" dirty="0">
+                <a:solidFill>
+                  <a:srgbClr val="CBCCC6"/>
+                </a:solidFill>
+                <a:effectLst/>
+                <a:latin typeface="Consolas" panose="020B0609020204030204" pitchFamily="49" charset="0"/>
+              </a:rPr>
+              <a:t>; </a:t>
+            </a:r>
+            <a:r>
+              <a:rPr lang="en-US" b="0" dirty="0" err="1">
+                <a:solidFill>
+                  <a:srgbClr val="CBCCC6"/>
+                </a:solidFill>
+                <a:effectLst/>
+                <a:latin typeface="Consolas" panose="020B0609020204030204" pitchFamily="49" charset="0"/>
+              </a:rPr>
+              <a:t>i</a:t>
+            </a:r>
+            <a:r>
+              <a:rPr lang="en-US" b="0" dirty="0">
+                <a:solidFill>
+                  <a:srgbClr val="F29E74"/>
+                </a:solidFill>
+                <a:effectLst/>
+                <a:latin typeface="Consolas" panose="020B0609020204030204" pitchFamily="49" charset="0"/>
+              </a:rPr>
+              <a:t>++</a:t>
+            </a:r>
+            <a:r>
+              <a:rPr lang="en-US" b="0" dirty="0">
+                <a:solidFill>
+                  <a:srgbClr val="CBCCC6"/>
+                </a:solidFill>
+                <a:effectLst/>
+                <a:latin typeface="Consolas" panose="020B0609020204030204" pitchFamily="49" charset="0"/>
+              </a:rPr>
+              <a:t>)</a:t>
+            </a:r>
+          </a:p>
+          <a:p>
+            <a:r>
+              <a:rPr lang="en-US" b="0" dirty="0">
+                <a:solidFill>
+                  <a:srgbClr val="CBCCC6"/>
+                </a:solidFill>
+                <a:effectLst/>
+                <a:latin typeface="Consolas" panose="020B0609020204030204" pitchFamily="49" charset="0"/>
+              </a:rPr>
+              <a:t>    {</a:t>
+            </a:r>
+          </a:p>
+          <a:p>
+            <a:r>
+              <a:rPr lang="en-US" b="0" dirty="0">
+                <a:solidFill>
+                  <a:srgbClr val="CBCCC6"/>
+                </a:solidFill>
+                <a:effectLst/>
+                <a:latin typeface="Consolas" panose="020B0609020204030204" pitchFamily="49" charset="0"/>
+              </a:rPr>
+              <a:t>        </a:t>
+            </a:r>
+            <a:r>
+              <a:rPr lang="en-US" b="0" dirty="0" err="1">
+                <a:solidFill>
+                  <a:srgbClr val="CBCCC6"/>
+                </a:solidFill>
+                <a:effectLst/>
+                <a:latin typeface="Consolas" panose="020B0609020204030204" pitchFamily="49" charset="0"/>
+              </a:rPr>
+              <a:t>cout</a:t>
+            </a:r>
+            <a:r>
+              <a:rPr lang="en-US" b="0" dirty="0">
+                <a:solidFill>
+                  <a:srgbClr val="CBCCC6"/>
+                </a:solidFill>
+                <a:effectLst/>
+                <a:latin typeface="Consolas" panose="020B0609020204030204" pitchFamily="49" charset="0"/>
+              </a:rPr>
+              <a:t> </a:t>
+            </a:r>
+            <a:r>
+              <a:rPr lang="en-US" b="0" dirty="0">
+                <a:solidFill>
+                  <a:srgbClr val="F29E74"/>
+                </a:solidFill>
+                <a:effectLst/>
+                <a:latin typeface="Consolas" panose="020B0609020204030204" pitchFamily="49" charset="0"/>
+              </a:rPr>
+              <a:t>&lt;&lt;</a:t>
+            </a:r>
+            <a:r>
+              <a:rPr lang="en-US" b="0" dirty="0">
+                <a:solidFill>
+                  <a:srgbClr val="CBCCC6"/>
+                </a:solidFill>
+                <a:effectLst/>
+                <a:latin typeface="Consolas" panose="020B0609020204030204" pitchFamily="49" charset="0"/>
+              </a:rPr>
+              <a:t> </a:t>
+            </a:r>
+            <a:r>
+              <a:rPr lang="en-US" b="0" dirty="0" err="1">
+                <a:solidFill>
+                  <a:srgbClr val="CBCCC6"/>
+                </a:solidFill>
+                <a:effectLst/>
+                <a:latin typeface="Consolas" panose="020B0609020204030204" pitchFamily="49" charset="0"/>
+              </a:rPr>
+              <a:t>broevi</a:t>
+            </a:r>
+            <a:r>
+              <a:rPr lang="en-US" b="0" dirty="0">
+                <a:solidFill>
+                  <a:srgbClr val="CBCCC6"/>
+                </a:solidFill>
+                <a:effectLst/>
+                <a:latin typeface="Consolas" panose="020B0609020204030204" pitchFamily="49" charset="0"/>
+              </a:rPr>
+              <a:t>[</a:t>
+            </a:r>
+            <a:r>
+              <a:rPr lang="en-US" b="0" dirty="0" err="1">
+                <a:solidFill>
+                  <a:srgbClr val="CBCCC6"/>
+                </a:solidFill>
+                <a:effectLst/>
+                <a:latin typeface="Consolas" panose="020B0609020204030204" pitchFamily="49" charset="0"/>
+              </a:rPr>
+              <a:t>i</a:t>
+            </a:r>
+            <a:r>
+              <a:rPr lang="en-US" b="0" dirty="0">
+                <a:solidFill>
+                  <a:srgbClr val="CBCCC6"/>
+                </a:solidFill>
+                <a:effectLst/>
+                <a:latin typeface="Consolas" panose="020B0609020204030204" pitchFamily="49" charset="0"/>
+              </a:rPr>
+              <a:t>] </a:t>
+            </a:r>
+            <a:r>
+              <a:rPr lang="en-US" b="0" dirty="0">
+                <a:solidFill>
+                  <a:srgbClr val="F29E74"/>
+                </a:solidFill>
+                <a:effectLst/>
+                <a:latin typeface="Consolas" panose="020B0609020204030204" pitchFamily="49" charset="0"/>
+              </a:rPr>
+              <a:t>&lt;&lt;</a:t>
+            </a:r>
+            <a:r>
+              <a:rPr lang="en-US" b="0" dirty="0">
+                <a:solidFill>
+                  <a:srgbClr val="CBCCC6"/>
+                </a:solidFill>
+                <a:effectLst/>
+                <a:latin typeface="Consolas" panose="020B0609020204030204" pitchFamily="49" charset="0"/>
+              </a:rPr>
+              <a:t> </a:t>
+            </a:r>
+            <a:r>
+              <a:rPr lang="en-US" b="0" dirty="0">
+                <a:solidFill>
+                  <a:srgbClr val="BAE67E"/>
+                </a:solidFill>
+                <a:effectLst/>
+                <a:latin typeface="Consolas" panose="020B0609020204030204" pitchFamily="49" charset="0"/>
+              </a:rPr>
+              <a:t>" "</a:t>
+            </a:r>
+            <a:r>
+              <a:rPr lang="en-US" b="0" dirty="0">
+                <a:solidFill>
+                  <a:srgbClr val="CBCCC6"/>
+                </a:solidFill>
+                <a:effectLst/>
+                <a:latin typeface="Consolas" panose="020B0609020204030204" pitchFamily="49" charset="0"/>
+              </a:rPr>
+              <a:t>;</a:t>
+            </a:r>
+          </a:p>
+          <a:p>
+            <a:r>
+              <a:rPr lang="en-US" b="0" dirty="0">
+                <a:solidFill>
+                  <a:srgbClr val="CBCCC6"/>
+                </a:solidFill>
+                <a:effectLst/>
+                <a:latin typeface="Consolas" panose="020B0609020204030204" pitchFamily="49" charset="0"/>
+              </a:rPr>
+              <a:t>    }</a:t>
+            </a:r>
+          </a:p>
+          <a:p>
+            <a:br>
+              <a:rPr lang="en-US" b="0" dirty="0">
+                <a:solidFill>
+                  <a:srgbClr val="CBCCC6"/>
+                </a:solidFill>
+                <a:effectLst/>
+                <a:latin typeface="Consolas" panose="020B0609020204030204" pitchFamily="49" charset="0"/>
+              </a:rPr>
+            </a:br>
+            <a:r>
+              <a:rPr lang="en-US" b="0" dirty="0">
+                <a:solidFill>
+                  <a:srgbClr val="CBCCC6"/>
+                </a:solidFill>
+                <a:effectLst/>
+                <a:latin typeface="Consolas" panose="020B0609020204030204" pitchFamily="49" charset="0"/>
+              </a:rPr>
+              <a:t>    </a:t>
+            </a:r>
+            <a:r>
+              <a:rPr lang="en-US" b="0" dirty="0">
+                <a:solidFill>
+                  <a:srgbClr val="FFA759"/>
+                </a:solidFill>
+                <a:effectLst/>
+                <a:latin typeface="Consolas" panose="020B0609020204030204" pitchFamily="49" charset="0"/>
+              </a:rPr>
+              <a:t>return</a:t>
+            </a:r>
+            <a:r>
+              <a:rPr lang="en-US" b="0" dirty="0">
+                <a:solidFill>
+                  <a:srgbClr val="CBCCC6"/>
+                </a:solidFill>
+                <a:effectLst/>
+                <a:latin typeface="Consolas" panose="020B0609020204030204" pitchFamily="49" charset="0"/>
+              </a:rPr>
+              <a:t> </a:t>
+            </a:r>
+            <a:r>
+              <a:rPr lang="en-US" b="0" dirty="0">
+                <a:solidFill>
+                  <a:srgbClr val="FFCC66"/>
+                </a:solidFill>
+                <a:effectLst/>
+                <a:latin typeface="Consolas" panose="020B0609020204030204" pitchFamily="49" charset="0"/>
+              </a:rPr>
+              <a:t>0</a:t>
+            </a:r>
+            <a:r>
+              <a:rPr lang="en-US" b="0" dirty="0">
+                <a:solidFill>
+                  <a:srgbClr val="CBCCC6"/>
+                </a:solidFill>
+                <a:effectLst/>
+                <a:latin typeface="Consolas" panose="020B0609020204030204" pitchFamily="49" charset="0"/>
+              </a:rPr>
+              <a:t>;</a:t>
+            </a:r>
+          </a:p>
+          <a:p>
+            <a:r>
+              <a:rPr lang="en-US" b="0" dirty="0">
+                <a:solidFill>
+                  <a:srgbClr val="CBCCC6"/>
+                </a:solidFill>
+                <a:effectLst/>
+                <a:latin typeface="Consolas" panose="020B0609020204030204" pitchFamily="49" charset="0"/>
+              </a:rPr>
+              <a:t>}</a:t>
+            </a:r>
+          </a:p>
+        </p:txBody>
+      </p:sp>
+      <p:sp>
+        <p:nvSpPr>
+          <p:cNvPr id="4" name="Slide Number Placeholder 3"/>
+          <p:cNvSpPr>
+            <a:spLocks noGrp="1"/>
+          </p:cNvSpPr>
+          <p:nvPr>
+            <p:ph type="sldNum" sz="quarter" idx="5"/>
+          </p:nvPr>
+        </p:nvSpPr>
+        <p:spPr/>
+        <p:txBody>
+          <a:bodyPr/>
+          <a:lstStyle/>
+          <a:p>
+            <a:fld id="{927A7433-3D10-4FDD-9EF2-B174CF946C18}" type="slidenum">
+              <a:rPr lang="en-US" smtClean="0"/>
+              <a:t>9</a:t>
+            </a:fld>
+            <a:endParaRPr lang="en-US"/>
+          </a:p>
+        </p:txBody>
+      </p:sp>
+    </p:spTree>
+    <p:extLst>
+      <p:ext uri="{BB962C8B-B14F-4D97-AF65-F5344CB8AC3E}">
+        <p14:creationId xmlns:p14="http://schemas.microsoft.com/office/powerpoint/2010/main" val="4278271375"/>
+      </p:ext>
+    </p:extLst>
+  </p:cSld>
+  <p:clrMapOvr>
+    <a:masterClrMapping/>
+  </p:clrMapOvr>
+</p:notes>
+</file>
+
+<file path=ppt/notesSlides/notesSlide7.xml><?xml version="1.0" encoding="utf-8"?>
 <p:notes xmlns:a="http://schemas.openxmlformats.org/drawingml/2006/main" xmlns:r="http://schemas.openxmlformats.org/officeDocument/2006/relationships" xmlns:p="http://schemas.openxmlformats.org/presentationml/2006/main">
   <p:cSld>
     <p:spTree>
@@ -14341,7 +15368,7 @@
           <p:nvPr/>
         </p:nvPicPr>
         <p:blipFill>
-          <a:blip r:embed="rId2">
+          <a:blip r:embed="rId3">
             <a:extLst>
               <a:ext uri="{28A0092B-C50C-407E-A947-70E740481C1C}">
                 <a14:useLocalDpi xmlns:a14="http://schemas.microsoft.com/office/drawing/2010/main" val="0"/>
@@ -14413,7 +15440,7 @@
           <p:nvPr/>
         </p:nvPicPr>
         <p:blipFill>
-          <a:blip r:embed="rId3">
+          <a:blip r:embed="rId4">
             <a:extLst>
               <a:ext uri="{28A0092B-C50C-407E-A947-70E740481C1C}">
                 <a14:useLocalDpi xmlns:a14="http://schemas.microsoft.com/office/drawing/2010/main" val="0"/>
@@ -14449,7 +15476,7 @@
           <p:nvPr/>
         </p:nvPicPr>
         <p:blipFill>
-          <a:blip r:embed="rId4">
+          <a:blip r:embed="rId5">
             <a:extLst>
               <a:ext uri="{28A0092B-C50C-407E-A947-70E740481C1C}">
                 <a14:useLocalDpi xmlns:a14="http://schemas.microsoft.com/office/drawing/2010/main" val="0"/>

</xml_diff>